<commit_message>
completed inpatient claims slides
</commit_message>
<xml_diff>
--- a/PowerPoints/Phase 3 - Claims Terminology/016 Inpatient Claims.pptx
+++ b/PowerPoints/Phase 3 - Claims Terminology/016 Inpatient Claims.pptx
@@ -5,13 +5,14 @@
     <p:sldMasterId id="2147483749" r:id="rId1"/>
     <p:sldMasterId id="2147484036" r:id="rId2"/>
   </p:sldMasterIdLst>
+  <p:notesMasterIdLst>
+    <p:notesMasterId r:id="rId7"/>
+  </p:notesMasterIdLst>
   <p:sldIdLst>
     <p:sldId id="256" r:id="rId3"/>
     <p:sldId id="257" r:id="rId4"/>
     <p:sldId id="258" r:id="rId5"/>
-    <p:sldId id="259" r:id="rId6"/>
-    <p:sldId id="260" r:id="rId7"/>
-    <p:sldId id="261" r:id="rId8"/>
+    <p:sldId id="261" r:id="rId6"/>
   </p:sldIdLst>
   <p:sldSz cx="12192000" cy="6858000"/>
   <p:notesSz cx="6858000" cy="9144000"/>
@@ -113,6 +114,464 @@
 </p:presentation>
 </file>
 
+<file path=ppt/notesMasters/notesMaster1.xml><?xml version="1.0" encoding="utf-8"?>
+<p:notesMaster xmlns:a="http://schemas.openxmlformats.org/drawingml/2006/main" xmlns:r="http://schemas.openxmlformats.org/officeDocument/2006/relationships" xmlns:p="http://schemas.openxmlformats.org/presentationml/2006/main">
+  <p:cSld>
+    <p:bg>
+      <p:bgRef idx="1001">
+        <a:schemeClr val="bg1"/>
+      </p:bgRef>
+    </p:bg>
+    <p:spTree>
+      <p:nvGrpSpPr>
+        <p:cNvPr id="1" name=""/>
+        <p:cNvGrpSpPr/>
+        <p:nvPr/>
+      </p:nvGrpSpPr>
+      <p:grpSpPr>
+        <a:xfrm>
+          <a:off x="0" y="0"/>
+          <a:ext cx="0" cy="0"/>
+          <a:chOff x="0" y="0"/>
+          <a:chExt cx="0" cy="0"/>
+        </a:xfrm>
+      </p:grpSpPr>
+      <p:sp>
+        <p:nvSpPr>
+          <p:cNvPr id="2" name="Header Placeholder 1"/>
+          <p:cNvSpPr>
+            <a:spLocks noGrp="1"/>
+          </p:cNvSpPr>
+          <p:nvPr>
+            <p:ph type="hdr" sz="quarter"/>
+          </p:nvPr>
+        </p:nvSpPr>
+        <p:spPr>
+          <a:xfrm>
+            <a:off x="0" y="0"/>
+            <a:ext cx="2971800" cy="457200"/>
+          </a:xfrm>
+          <a:prstGeom prst="rect">
+            <a:avLst/>
+          </a:prstGeom>
+        </p:spPr>
+        <p:txBody>
+          <a:bodyPr vert="horz" lIns="91440" tIns="45720" rIns="91440" bIns="45720" rtlCol="0"/>
+          <a:lstStyle>
+            <a:lvl1pPr algn="l">
+              <a:defRPr sz="1200"/>
+            </a:lvl1pPr>
+          </a:lstStyle>
+          <a:p>
+            <a:endParaRPr lang="en-US"/>
+          </a:p>
+        </p:txBody>
+      </p:sp>
+      <p:sp>
+        <p:nvSpPr>
+          <p:cNvPr id="3" name="Date Placeholder 2"/>
+          <p:cNvSpPr>
+            <a:spLocks noGrp="1"/>
+          </p:cNvSpPr>
+          <p:nvPr>
+            <p:ph type="dt" idx="1"/>
+          </p:nvPr>
+        </p:nvSpPr>
+        <p:spPr>
+          <a:xfrm>
+            <a:off x="3884613" y="0"/>
+            <a:ext cx="2971800" cy="457200"/>
+          </a:xfrm>
+          <a:prstGeom prst="rect">
+            <a:avLst/>
+          </a:prstGeom>
+        </p:spPr>
+        <p:txBody>
+          <a:bodyPr vert="horz" lIns="91440" tIns="45720" rIns="91440" bIns="45720" rtlCol="0"/>
+          <a:lstStyle>
+            <a:lvl1pPr algn="r">
+              <a:defRPr sz="1200"/>
+            </a:lvl1pPr>
+          </a:lstStyle>
+          <a:p>
+            <a:fld id="{FF759215-93B8-4CA6-9F07-54E411997C16}" type="datetimeFigureOut">
+              <a:rPr lang="en-US" smtClean="0"/>
+              <a:t>3/3/2016</a:t>
+            </a:fld>
+            <a:endParaRPr lang="en-US"/>
+          </a:p>
+        </p:txBody>
+      </p:sp>
+      <p:sp>
+        <p:nvSpPr>
+          <p:cNvPr id="4" name="Slide Image Placeholder 3"/>
+          <p:cNvSpPr>
+            <a:spLocks noGrp="1" noRot="1" noChangeAspect="1"/>
+          </p:cNvSpPr>
+          <p:nvPr>
+            <p:ph type="sldImg" idx="2"/>
+          </p:nvPr>
+        </p:nvSpPr>
+        <p:spPr>
+          <a:xfrm>
+            <a:off x="381000" y="685800"/>
+            <a:ext cx="6096000" cy="3429000"/>
+          </a:xfrm>
+          <a:prstGeom prst="rect">
+            <a:avLst/>
+          </a:prstGeom>
+          <a:noFill/>
+          <a:ln w="12700">
+            <a:solidFill>
+              <a:prstClr val="black"/>
+            </a:solidFill>
+          </a:ln>
+        </p:spPr>
+        <p:txBody>
+          <a:bodyPr vert="horz" lIns="91440" tIns="45720" rIns="91440" bIns="45720" rtlCol="0" anchor="ctr"/>
+          <a:lstStyle/>
+          <a:p>
+            <a:endParaRPr lang="en-US"/>
+          </a:p>
+        </p:txBody>
+      </p:sp>
+      <p:sp>
+        <p:nvSpPr>
+          <p:cNvPr id="5" name="Notes Placeholder 4"/>
+          <p:cNvSpPr>
+            <a:spLocks noGrp="1"/>
+          </p:cNvSpPr>
+          <p:nvPr>
+            <p:ph type="body" sz="quarter" idx="3"/>
+          </p:nvPr>
+        </p:nvSpPr>
+        <p:spPr>
+          <a:xfrm>
+            <a:off x="685800" y="4343400"/>
+            <a:ext cx="5486400" cy="4114800"/>
+          </a:xfrm>
+          <a:prstGeom prst="rect">
+            <a:avLst/>
+          </a:prstGeom>
+        </p:spPr>
+        <p:txBody>
+          <a:bodyPr vert="horz" lIns="91440" tIns="45720" rIns="91440" bIns="45720" rtlCol="0"/>
+          <a:lstStyle/>
+          <a:p>
+            <a:pPr lvl="0"/>
+            <a:r>
+              <a:rPr lang="en-US" smtClean="0"/>
+              <a:t>Click to edit Master text styles</a:t>
+            </a:r>
+          </a:p>
+          <a:p>
+            <a:pPr lvl="1"/>
+            <a:r>
+              <a:rPr lang="en-US" smtClean="0"/>
+              <a:t>Second level</a:t>
+            </a:r>
+          </a:p>
+          <a:p>
+            <a:pPr lvl="2"/>
+            <a:r>
+              <a:rPr lang="en-US" smtClean="0"/>
+              <a:t>Third level</a:t>
+            </a:r>
+          </a:p>
+          <a:p>
+            <a:pPr lvl="3"/>
+            <a:r>
+              <a:rPr lang="en-US" smtClean="0"/>
+              <a:t>Fourth level</a:t>
+            </a:r>
+          </a:p>
+          <a:p>
+            <a:pPr lvl="4"/>
+            <a:r>
+              <a:rPr lang="en-US" smtClean="0"/>
+              <a:t>Fifth level</a:t>
+            </a:r>
+            <a:endParaRPr lang="en-US"/>
+          </a:p>
+        </p:txBody>
+      </p:sp>
+      <p:sp>
+        <p:nvSpPr>
+          <p:cNvPr id="6" name="Footer Placeholder 5"/>
+          <p:cNvSpPr>
+            <a:spLocks noGrp="1"/>
+          </p:cNvSpPr>
+          <p:nvPr>
+            <p:ph type="ftr" sz="quarter" idx="4"/>
+          </p:nvPr>
+        </p:nvSpPr>
+        <p:spPr>
+          <a:xfrm>
+            <a:off x="0" y="8685213"/>
+            <a:ext cx="2971800" cy="457200"/>
+          </a:xfrm>
+          <a:prstGeom prst="rect">
+            <a:avLst/>
+          </a:prstGeom>
+        </p:spPr>
+        <p:txBody>
+          <a:bodyPr vert="horz" lIns="91440" tIns="45720" rIns="91440" bIns="45720" rtlCol="0" anchor="b"/>
+          <a:lstStyle>
+            <a:lvl1pPr algn="l">
+              <a:defRPr sz="1200"/>
+            </a:lvl1pPr>
+          </a:lstStyle>
+          <a:p>
+            <a:endParaRPr lang="en-US"/>
+          </a:p>
+        </p:txBody>
+      </p:sp>
+      <p:sp>
+        <p:nvSpPr>
+          <p:cNvPr id="7" name="Slide Number Placeholder 6"/>
+          <p:cNvSpPr>
+            <a:spLocks noGrp="1"/>
+          </p:cNvSpPr>
+          <p:nvPr>
+            <p:ph type="sldNum" sz="quarter" idx="5"/>
+          </p:nvPr>
+        </p:nvSpPr>
+        <p:spPr>
+          <a:xfrm>
+            <a:off x="3884613" y="8685213"/>
+            <a:ext cx="2971800" cy="457200"/>
+          </a:xfrm>
+          <a:prstGeom prst="rect">
+            <a:avLst/>
+          </a:prstGeom>
+        </p:spPr>
+        <p:txBody>
+          <a:bodyPr vert="horz" lIns="91440" tIns="45720" rIns="91440" bIns="45720" rtlCol="0" anchor="b"/>
+          <a:lstStyle>
+            <a:lvl1pPr algn="r">
+              <a:defRPr sz="1200"/>
+            </a:lvl1pPr>
+          </a:lstStyle>
+          <a:p>
+            <a:fld id="{91C79066-A7EE-4314-9516-9B3373561274}" type="slidenum">
+              <a:rPr lang="en-US" smtClean="0"/>
+              <a:t>‹#›</a:t>
+            </a:fld>
+            <a:endParaRPr lang="en-US"/>
+          </a:p>
+        </p:txBody>
+      </p:sp>
+    </p:spTree>
+    <p:extLst>
+      <p:ext uri="{BB962C8B-B14F-4D97-AF65-F5344CB8AC3E}">
+        <p14:creationId xmlns:p14="http://schemas.microsoft.com/office/powerpoint/2010/main" val="3623360372"/>
+      </p:ext>
+    </p:extLst>
+  </p:cSld>
+  <p:clrMap bg1="lt1" tx1="dk1" bg2="lt2" tx2="dk2" accent1="accent1" accent2="accent2" accent3="accent3" accent4="accent4" accent5="accent5" accent6="accent6" hlink="hlink" folHlink="folHlink"/>
+  <p:notesStyle>
+    <a:lvl1pPr marL="0" algn="l" defTabSz="914400" rtl="0" eaLnBrk="1" latinLnBrk="0" hangingPunct="1">
+      <a:defRPr sz="1200" kern="1200">
+        <a:solidFill>
+          <a:schemeClr val="tx1"/>
+        </a:solidFill>
+        <a:latin typeface="+mn-lt"/>
+        <a:ea typeface="+mn-ea"/>
+        <a:cs typeface="+mn-cs"/>
+      </a:defRPr>
+    </a:lvl1pPr>
+    <a:lvl2pPr marL="457200" algn="l" defTabSz="914400" rtl="0" eaLnBrk="1" latinLnBrk="0" hangingPunct="1">
+      <a:defRPr sz="1200" kern="1200">
+        <a:solidFill>
+          <a:schemeClr val="tx1"/>
+        </a:solidFill>
+        <a:latin typeface="+mn-lt"/>
+        <a:ea typeface="+mn-ea"/>
+        <a:cs typeface="+mn-cs"/>
+      </a:defRPr>
+    </a:lvl2pPr>
+    <a:lvl3pPr marL="914400" algn="l" defTabSz="914400" rtl="0" eaLnBrk="1" latinLnBrk="0" hangingPunct="1">
+      <a:defRPr sz="1200" kern="1200">
+        <a:solidFill>
+          <a:schemeClr val="tx1"/>
+        </a:solidFill>
+        <a:latin typeface="+mn-lt"/>
+        <a:ea typeface="+mn-ea"/>
+        <a:cs typeface="+mn-cs"/>
+      </a:defRPr>
+    </a:lvl3pPr>
+    <a:lvl4pPr marL="1371600" algn="l" defTabSz="914400" rtl="0" eaLnBrk="1" latinLnBrk="0" hangingPunct="1">
+      <a:defRPr sz="1200" kern="1200">
+        <a:solidFill>
+          <a:schemeClr val="tx1"/>
+        </a:solidFill>
+        <a:latin typeface="+mn-lt"/>
+        <a:ea typeface="+mn-ea"/>
+        <a:cs typeface="+mn-cs"/>
+      </a:defRPr>
+    </a:lvl4pPr>
+    <a:lvl5pPr marL="1828800" algn="l" defTabSz="914400" rtl="0" eaLnBrk="1" latinLnBrk="0" hangingPunct="1">
+      <a:defRPr sz="1200" kern="1200">
+        <a:solidFill>
+          <a:schemeClr val="tx1"/>
+        </a:solidFill>
+        <a:latin typeface="+mn-lt"/>
+        <a:ea typeface="+mn-ea"/>
+        <a:cs typeface="+mn-cs"/>
+      </a:defRPr>
+    </a:lvl5pPr>
+    <a:lvl6pPr marL="2286000" algn="l" defTabSz="914400" rtl="0" eaLnBrk="1" latinLnBrk="0" hangingPunct="1">
+      <a:defRPr sz="1200" kern="1200">
+        <a:solidFill>
+          <a:schemeClr val="tx1"/>
+        </a:solidFill>
+        <a:latin typeface="+mn-lt"/>
+        <a:ea typeface="+mn-ea"/>
+        <a:cs typeface="+mn-cs"/>
+      </a:defRPr>
+    </a:lvl6pPr>
+    <a:lvl7pPr marL="2743200" algn="l" defTabSz="914400" rtl="0" eaLnBrk="1" latinLnBrk="0" hangingPunct="1">
+      <a:defRPr sz="1200" kern="1200">
+        <a:solidFill>
+          <a:schemeClr val="tx1"/>
+        </a:solidFill>
+        <a:latin typeface="+mn-lt"/>
+        <a:ea typeface="+mn-ea"/>
+        <a:cs typeface="+mn-cs"/>
+      </a:defRPr>
+    </a:lvl7pPr>
+    <a:lvl8pPr marL="3200400" algn="l" defTabSz="914400" rtl="0" eaLnBrk="1" latinLnBrk="0" hangingPunct="1">
+      <a:defRPr sz="1200" kern="1200">
+        <a:solidFill>
+          <a:schemeClr val="tx1"/>
+        </a:solidFill>
+        <a:latin typeface="+mn-lt"/>
+        <a:ea typeface="+mn-ea"/>
+        <a:cs typeface="+mn-cs"/>
+      </a:defRPr>
+    </a:lvl8pPr>
+    <a:lvl9pPr marL="3657600" algn="l" defTabSz="914400" rtl="0" eaLnBrk="1" latinLnBrk="0" hangingPunct="1">
+      <a:defRPr sz="1200" kern="1200">
+        <a:solidFill>
+          <a:schemeClr val="tx1"/>
+        </a:solidFill>
+        <a:latin typeface="+mn-lt"/>
+        <a:ea typeface="+mn-ea"/>
+        <a:cs typeface="+mn-cs"/>
+      </a:defRPr>
+    </a:lvl9pPr>
+  </p:notesStyle>
+</p:notesMaster>
+</file>
+
+<file path=ppt/notesSlides/notesSlide1.xml><?xml version="1.0" encoding="utf-8"?>
+<p:notes xmlns:a="http://schemas.openxmlformats.org/drawingml/2006/main" xmlns:r="http://schemas.openxmlformats.org/officeDocument/2006/relationships" xmlns:p="http://schemas.openxmlformats.org/presentationml/2006/main">
+  <p:cSld>
+    <p:spTree>
+      <p:nvGrpSpPr>
+        <p:cNvPr id="1" name=""/>
+        <p:cNvGrpSpPr/>
+        <p:nvPr/>
+      </p:nvGrpSpPr>
+      <p:grpSpPr>
+        <a:xfrm>
+          <a:off x="0" y="0"/>
+          <a:ext cx="0" cy="0"/>
+          <a:chOff x="0" y="0"/>
+          <a:chExt cx="0" cy="0"/>
+        </a:xfrm>
+      </p:grpSpPr>
+      <p:sp>
+        <p:nvSpPr>
+          <p:cNvPr id="2" name="Slide Image Placeholder 1"/>
+          <p:cNvSpPr>
+            <a:spLocks noGrp="1" noRot="1" noChangeAspect="1"/>
+          </p:cNvSpPr>
+          <p:nvPr>
+            <p:ph type="sldImg"/>
+          </p:nvPr>
+        </p:nvSpPr>
+        <p:spPr/>
+      </p:sp>
+      <p:sp>
+        <p:nvSpPr>
+          <p:cNvPr id="3" name="Notes Placeholder 2"/>
+          <p:cNvSpPr>
+            <a:spLocks noGrp="1"/>
+          </p:cNvSpPr>
+          <p:nvPr>
+            <p:ph type="body" idx="1"/>
+          </p:nvPr>
+        </p:nvSpPr>
+        <p:spPr/>
+        <p:txBody>
+          <a:bodyPr/>
+          <a:lstStyle/>
+          <a:p>
+            <a:r>
+              <a:rPr lang="en-US" dirty="0" smtClean="0"/>
+              <a:t>Several fields in the claims database</a:t>
+            </a:r>
+            <a:r>
+              <a:rPr lang="en-US" baseline="0" dirty="0" smtClean="0"/>
+              <a:t> refer only to inpatient claims.  Admission date is the date the patient was formally admitted to the hospital.  Admission type codes describe whether the admission was and emergency, and urgent admission, an admission for an elective procedure, etc.  Admission source identifies how the patient came to the hospital.  For example, this field will describe if the patient was referred by their physician, or by a health clinic or other hospital.  Admission source will also identify patients who came in through the emergency department or from an ambulatory surgery facility.  The discharge status code describes if the patient was routinely discharge, or transferred to a different facility.  The admitting diagnosis is the </a:t>
+            </a:r>
+            <a:r>
+              <a:rPr lang="en-US" baseline="0" dirty="0" err="1" smtClean="0"/>
+              <a:t>primaruy</a:t>
+            </a:r>
+            <a:r>
+              <a:rPr lang="en-US" baseline="0" dirty="0" smtClean="0"/>
+              <a:t> diagnosis used to explain the inpatient admission, while the present on admission code identifies all diagnoses that where </a:t>
+            </a:r>
+            <a:r>
+              <a:rPr lang="en-US" baseline="0" dirty="0" err="1" smtClean="0"/>
+              <a:t>presenyt</a:t>
+            </a:r>
+            <a:r>
+              <a:rPr lang="en-US" baseline="0" dirty="0" smtClean="0"/>
+              <a:t> when the patient was admitted.</a:t>
+            </a:r>
+            <a:endParaRPr lang="en-US" dirty="0"/>
+          </a:p>
+        </p:txBody>
+      </p:sp>
+      <p:sp>
+        <p:nvSpPr>
+          <p:cNvPr id="4" name="Slide Number Placeholder 3"/>
+          <p:cNvSpPr>
+            <a:spLocks noGrp="1"/>
+          </p:cNvSpPr>
+          <p:nvPr>
+            <p:ph type="sldNum" sz="quarter" idx="10"/>
+          </p:nvPr>
+        </p:nvSpPr>
+        <p:spPr/>
+        <p:txBody>
+          <a:bodyPr/>
+          <a:lstStyle/>
+          <a:p>
+            <a:fld id="{91C79066-A7EE-4314-9516-9B3373561274}" type="slidenum">
+              <a:rPr lang="en-US" smtClean="0"/>
+              <a:t>3</a:t>
+            </a:fld>
+            <a:endParaRPr lang="en-US"/>
+          </a:p>
+        </p:txBody>
+      </p:sp>
+    </p:spTree>
+    <p:extLst>
+      <p:ext uri="{BB962C8B-B14F-4D97-AF65-F5344CB8AC3E}">
+        <p14:creationId xmlns:p14="http://schemas.microsoft.com/office/powerpoint/2010/main" val="918588333"/>
+      </p:ext>
+    </p:extLst>
+  </p:cSld>
+  <p:clrMapOvr>
+    <a:masterClrMapping/>
+  </p:clrMapOvr>
+</p:notes>
+</file>
+
 <file path=ppt/slideLayouts/slideLayout1.xml><?xml version="1.0" encoding="utf-8"?>
 <p:sldLayout xmlns:a="http://schemas.openxmlformats.org/drawingml/2006/main" xmlns:r="http://schemas.openxmlformats.org/officeDocument/2006/relationships" xmlns:p="http://schemas.openxmlformats.org/presentationml/2006/main" type="title" preserve="1">
   <p:cSld name="Title Slide">
@@ -255,7 +714,7 @@
           <a:p>
             <a:fld id="{FF632088-7E42-4B13-8645-6CA4616862AF}" type="datetimeFigureOut">
               <a:rPr lang="en-US" smtClean="0"/>
-              <a:t>3/2/2016</a:t>
+              <a:t>3/3/2016</a:t>
             </a:fld>
             <a:endParaRPr lang="en-US"/>
           </a:p>
@@ -425,7 +884,7 @@
           <a:p>
             <a:fld id="{FF632088-7E42-4B13-8645-6CA4616862AF}" type="datetimeFigureOut">
               <a:rPr lang="en-US" smtClean="0"/>
-              <a:t>3/2/2016</a:t>
+              <a:t>3/3/2016</a:t>
             </a:fld>
             <a:endParaRPr lang="en-US"/>
           </a:p>
@@ -605,7 +1064,7 @@
           <a:p>
             <a:fld id="{FF632088-7E42-4B13-8645-6CA4616862AF}" type="datetimeFigureOut">
               <a:rPr lang="en-US" smtClean="0"/>
-              <a:t>3/2/2016</a:t>
+              <a:t>3/3/2016</a:t>
             </a:fld>
             <a:endParaRPr lang="en-US"/>
           </a:p>
@@ -805,7 +1264,7 @@
           <a:p>
             <a:fld id="{FF632088-7E42-4B13-8645-6CA4616862AF}" type="datetimeFigureOut">
               <a:rPr lang="en-US" smtClean="0"/>
-              <a:t>3/2/2016</a:t>
+              <a:t>3/3/2016</a:t>
             </a:fld>
             <a:endParaRPr lang="en-US"/>
           </a:p>
@@ -1022,7 +1481,7 @@
           <a:p>
             <a:fld id="{FF632088-7E42-4B13-8645-6CA4616862AF}" type="datetimeFigureOut">
               <a:rPr lang="en-US" smtClean="0"/>
-              <a:t>3/2/2016</a:t>
+              <a:t>3/3/2016</a:t>
             </a:fld>
             <a:endParaRPr lang="en-US"/>
           </a:p>
@@ -1307,7 +1766,7 @@
           <a:p>
             <a:fld id="{FF632088-7E42-4B13-8645-6CA4616862AF}" type="datetimeFigureOut">
               <a:rPr lang="en-US" smtClean="0"/>
-              <a:t>3/2/2016</a:t>
+              <a:t>3/3/2016</a:t>
             </a:fld>
             <a:endParaRPr lang="en-US"/>
           </a:p>
@@ -1581,7 +2040,7 @@
           <a:p>
             <a:fld id="{FF632088-7E42-4B13-8645-6CA4616862AF}" type="datetimeFigureOut">
               <a:rPr lang="en-US" smtClean="0"/>
-              <a:t>3/2/2016</a:t>
+              <a:t>3/3/2016</a:t>
             </a:fld>
             <a:endParaRPr lang="en-US"/>
           </a:p>
@@ -1678,7 +2137,7 @@
   </p:clrMapOvr>
   <p:extLst>
     <p:ext uri="{DCECCB84-F9BA-43D5-87BE-67443E8EF086}">
-      <p15:sldGuideLst xmlns="" xmlns:p15="http://schemas.microsoft.com/office/powerpoint/2012/main"/>
+      <p15:sldGuideLst xmlns:p15="http://schemas.microsoft.com/office/powerpoint/2012/main" xmlns=""/>
     </p:ext>
   </p:extLst>
 </p:sldLayout>
@@ -2008,7 +2467,7 @@
           <a:p>
             <a:fld id="{FF632088-7E42-4B13-8645-6CA4616862AF}" type="datetimeFigureOut">
               <a:rPr lang="en-US" smtClean="0"/>
-              <a:t>3/2/2016</a:t>
+              <a:t>3/3/2016</a:t>
             </a:fld>
             <a:endParaRPr lang="en-US"/>
           </a:p>
@@ -2105,7 +2564,7 @@
   </p:clrMapOvr>
   <p:extLst>
     <p:ext uri="{DCECCB84-F9BA-43D5-87BE-67443E8EF086}">
-      <p15:sldGuideLst xmlns="" xmlns:p15="http://schemas.microsoft.com/office/powerpoint/2012/main"/>
+      <p15:sldGuideLst xmlns:p15="http://schemas.microsoft.com/office/powerpoint/2012/main" xmlns=""/>
     </p:ext>
   </p:extLst>
 </p:sldLayout>
@@ -2168,7 +2627,7 @@
           <a:p>
             <a:fld id="{FF632088-7E42-4B13-8645-6CA4616862AF}" type="datetimeFigureOut">
               <a:rPr lang="en-US" smtClean="0"/>
-              <a:t>3/2/2016</a:t>
+              <a:t>3/3/2016</a:t>
             </a:fld>
             <a:endParaRPr lang="en-US"/>
           </a:p>
@@ -2300,7 +2759,7 @@
           <a:p>
             <a:fld id="{FF632088-7E42-4B13-8645-6CA4616862AF}" type="datetimeFigureOut">
               <a:rPr lang="en-US" smtClean="0"/>
-              <a:t>3/2/2016</a:t>
+              <a:t>3/3/2016</a:t>
             </a:fld>
             <a:endParaRPr lang="en-US"/>
           </a:p>
@@ -2551,7 +3010,7 @@
           <a:p>
             <a:fld id="{FF632088-7E42-4B13-8645-6CA4616862AF}" type="datetimeFigureOut">
               <a:rPr lang="en-US" smtClean="0"/>
-              <a:t>3/2/2016</a:t>
+              <a:t>3/3/2016</a:t>
             </a:fld>
             <a:endParaRPr lang="en-US"/>
           </a:p>
@@ -2648,7 +3107,7 @@
   </p:clrMapOvr>
   <p:extLst>
     <p:ext uri="{DCECCB84-F9BA-43D5-87BE-67443E8EF086}">
-      <p15:sldGuideLst xmlns="" xmlns:p15="http://schemas.microsoft.com/office/powerpoint/2012/main"/>
+      <p15:sldGuideLst xmlns:p15="http://schemas.microsoft.com/office/powerpoint/2012/main" xmlns=""/>
     </p:ext>
   </p:extLst>
 </p:sldLayout>
@@ -2763,7 +3222,7 @@
           <a:p>
             <a:fld id="{FF632088-7E42-4B13-8645-6CA4616862AF}" type="datetimeFigureOut">
               <a:rPr lang="en-US" smtClean="0"/>
-              <a:t>3/2/2016</a:t>
+              <a:t>3/3/2016</a:t>
             </a:fld>
             <a:endParaRPr lang="en-US"/>
           </a:p>
@@ -3181,7 +3640,7 @@
           <a:p>
             <a:fld id="{FF632088-7E42-4B13-8645-6CA4616862AF}" type="datetimeFigureOut">
               <a:rPr lang="en-US" smtClean="0"/>
-              <a:t>3/2/2016</a:t>
+              <a:t>3/3/2016</a:t>
             </a:fld>
             <a:endParaRPr lang="en-US"/>
           </a:p>
@@ -3393,7 +3852,7 @@
           <a:p>
             <a:fld id="{FF632088-7E42-4B13-8645-6CA4616862AF}" type="datetimeFigureOut">
               <a:rPr lang="en-US" smtClean="0"/>
-              <a:t>3/2/2016</a:t>
+              <a:t>3/3/2016</a:t>
             </a:fld>
             <a:endParaRPr lang="en-US"/>
           </a:p>
@@ -3614,7 +4073,7 @@
           <a:p>
             <a:fld id="{FF632088-7E42-4B13-8645-6CA4616862AF}" type="datetimeFigureOut">
               <a:rPr lang="en-US" smtClean="0"/>
-              <a:t>3/2/2016</a:t>
+              <a:t>3/3/2016</a:t>
             </a:fld>
             <a:endParaRPr lang="en-US"/>
           </a:p>
@@ -3902,7 +4361,7 @@
           <a:p>
             <a:fld id="{FF632088-7E42-4B13-8645-6CA4616862AF}" type="datetimeFigureOut">
               <a:rPr lang="en-US" smtClean="0"/>
-              <a:t>3/2/2016</a:t>
+              <a:t>3/3/2016</a:t>
             </a:fld>
             <a:endParaRPr lang="en-US"/>
           </a:p>
@@ -4134,7 +4593,7 @@
           <a:p>
             <a:fld id="{FF632088-7E42-4B13-8645-6CA4616862AF}" type="datetimeFigureOut">
               <a:rPr lang="en-US" smtClean="0"/>
-              <a:t>3/2/2016</a:t>
+              <a:t>3/3/2016</a:t>
             </a:fld>
             <a:endParaRPr lang="en-US"/>
           </a:p>
@@ -4194,7 +4653,7 @@
   </p:clrMapOvr>
   <p:extLst>
     <p:ext uri="{DCECCB84-F9BA-43D5-87BE-67443E8EF086}">
-      <p15:sldGuideLst xmlns="" xmlns:p15="http://schemas.microsoft.com/office/powerpoint/2012/main"/>
+      <p15:sldGuideLst xmlns:p15="http://schemas.microsoft.com/office/powerpoint/2012/main" xmlns=""/>
     </p:ext>
   </p:extLst>
 </p:sldLayout>
@@ -4486,7 +4945,7 @@
           <a:p>
             <a:fld id="{FF632088-7E42-4B13-8645-6CA4616862AF}" type="datetimeFigureOut">
               <a:rPr lang="en-US" smtClean="0"/>
-              <a:t>3/2/2016</a:t>
+              <a:t>3/3/2016</a:t>
             </a:fld>
             <a:endParaRPr lang="en-US"/>
           </a:p>
@@ -4569,7 +5028,7 @@
   </p:clrMapOvr>
   <p:extLst>
     <p:ext uri="{DCECCB84-F9BA-43D5-87BE-67443E8EF086}">
-      <p15:sldGuideLst xmlns="" xmlns:p15="http://schemas.microsoft.com/office/powerpoint/2012/main"/>
+      <p15:sldGuideLst xmlns:p15="http://schemas.microsoft.com/office/powerpoint/2012/main" xmlns=""/>
     </p:ext>
   </p:extLst>
 </p:sldLayout>
@@ -4609,7 +5068,7 @@
           <a:p>
             <a:fld id="{FF632088-7E42-4B13-8645-6CA4616862AF}" type="datetimeFigureOut">
               <a:rPr lang="en-US" smtClean="0"/>
-              <a:t>3/2/2016</a:t>
+              <a:t>3/3/2016</a:t>
             </a:fld>
             <a:endParaRPr lang="en-US"/>
           </a:p>
@@ -4727,7 +5186,7 @@
           <a:p>
             <a:fld id="{FF632088-7E42-4B13-8645-6CA4616862AF}" type="datetimeFigureOut">
               <a:rPr lang="en-US" smtClean="0"/>
-              <a:t>3/2/2016</a:t>
+              <a:t>3/3/2016</a:t>
             </a:fld>
             <a:endParaRPr lang="en-US"/>
           </a:p>
@@ -5011,7 +5470,7 @@
           <a:p>
             <a:fld id="{FF632088-7E42-4B13-8645-6CA4616862AF}" type="datetimeFigureOut">
               <a:rPr lang="en-US" smtClean="0"/>
-              <a:t>3/2/2016</a:t>
+              <a:t>3/3/2016</a:t>
             </a:fld>
             <a:endParaRPr lang="en-US"/>
           </a:p>
@@ -5071,7 +5530,7 @@
   </p:clrMapOvr>
   <p:extLst>
     <p:ext uri="{DCECCB84-F9BA-43D5-87BE-67443E8EF086}">
-      <p15:sldGuideLst xmlns="" xmlns:p15="http://schemas.microsoft.com/office/powerpoint/2012/main"/>
+      <p15:sldGuideLst xmlns:p15="http://schemas.microsoft.com/office/powerpoint/2012/main" xmlns=""/>
     </p:ext>
   </p:extLst>
 </p:sldLayout>
@@ -5280,7 +5739,7 @@
           <a:p>
             <a:fld id="{FF632088-7E42-4B13-8645-6CA4616862AF}" type="datetimeFigureOut">
               <a:rPr lang="en-US" smtClean="0"/>
-              <a:t>3/2/2016</a:t>
+              <a:t>3/3/2016</a:t>
             </a:fld>
             <a:endParaRPr lang="en-US"/>
           </a:p>
@@ -5494,7 +5953,7 @@
           <a:p>
             <a:fld id="{FF632088-7E42-4B13-8645-6CA4616862AF}" type="datetimeFigureOut">
               <a:rPr lang="en-US" smtClean="0"/>
-              <a:t>3/2/2016</a:t>
+              <a:t>3/3/2016</a:t>
             </a:fld>
             <a:endParaRPr lang="en-US"/>
           </a:p>
@@ -5870,7 +6329,7 @@
   </p:txStyles>
   <p:extLst>
     <p:ext uri="{27BBF7A9-308A-43DC-89C8-2F10F3537804}">
-      <p15:sldGuideLst xmlns="" xmlns:p15="http://schemas.microsoft.com/office/powerpoint/2012/main"/>
+      <p15:sldGuideLst xmlns:p15="http://schemas.microsoft.com/office/powerpoint/2012/main" xmlns=""/>
     </p:ext>
   </p:extLst>
 </p:sldMaster>
@@ -6099,7 +6558,7 @@
           <a:p>
             <a:fld id="{FF632088-7E42-4B13-8645-6CA4616862AF}" type="datetimeFigureOut">
               <a:rPr lang="en-US" smtClean="0"/>
-              <a:t>3/2/2016</a:t>
+              <a:t>3/3/2016</a:t>
             </a:fld>
             <a:endParaRPr lang="en-US"/>
           </a:p>
@@ -6567,7 +7026,7 @@
   </p:txStyles>
   <p:extLst>
     <p:ext uri="{27BBF7A9-308A-43DC-89C8-2F10F3537804}">
-      <p15:sldGuideLst xmlns="" xmlns:p15="http://schemas.microsoft.com/office/powerpoint/2012/main"/>
+      <p15:sldGuideLst xmlns:p15="http://schemas.microsoft.com/office/powerpoint/2012/main" xmlns=""/>
     </p:ext>
   </p:extLst>
 </p:sldMaster>
@@ -6681,7 +7140,11 @@
           <a:bodyPr/>
           <a:lstStyle/>
           <a:p>
-            <a:endParaRPr lang="en-US"/>
+            <a:r>
+              <a:rPr lang="en-US" dirty="0" smtClean="0"/>
+              <a:t>Inpatient Services</a:t>
+            </a:r>
+            <a:endParaRPr lang="en-US" dirty="0"/>
           </a:p>
         </p:txBody>
       </p:sp>
@@ -6700,6 +7163,22 @@
           <a:bodyPr/>
           <a:lstStyle/>
           <a:p>
+            <a:r>
+              <a:rPr lang="en-US" dirty="0" smtClean="0"/>
+              <a:t>Inpatient services occur after a doctor formally admits a patient to a hospital.</a:t>
+            </a:r>
+          </a:p>
+          <a:p>
+            <a:r>
+              <a:rPr lang="en-US" dirty="0" smtClean="0"/>
+              <a:t>An inpatient stay continues until the patients discharge date.</a:t>
+            </a:r>
+          </a:p>
+          <a:p>
+            <a:r>
+              <a:rPr lang="en-US" dirty="0" smtClean="0"/>
+              <a:t>All medical procedures and prescription drugs occurring during this time will be recorded as part of the inpatient stay.</a:t>
+            </a:r>
             <a:endParaRPr lang="en-US" dirty="0"/>
           </a:p>
         </p:txBody>
@@ -6749,7 +7228,11 @@
           <a:bodyPr/>
           <a:lstStyle/>
           <a:p>
-            <a:endParaRPr lang="en-US"/>
+            <a:r>
+              <a:rPr lang="en-US" dirty="0" smtClean="0"/>
+              <a:t>Inpatient data elements</a:t>
+            </a:r>
+            <a:endParaRPr lang="en-US" dirty="0"/>
           </a:p>
         </p:txBody>
       </p:sp>
@@ -6768,6 +7251,40 @@
           <a:bodyPr/>
           <a:lstStyle/>
           <a:p>
+            <a:r>
+              <a:rPr lang="en-US" dirty="0" smtClean="0"/>
+              <a:t>Admission Date</a:t>
+            </a:r>
+          </a:p>
+          <a:p>
+            <a:r>
+              <a:rPr lang="en-US" dirty="0" smtClean="0"/>
+              <a:t>Admission Type</a:t>
+            </a:r>
+          </a:p>
+          <a:p>
+            <a:r>
+              <a:rPr lang="en-US" dirty="0" smtClean="0"/>
+              <a:t>Admission Source</a:t>
+            </a:r>
+          </a:p>
+          <a:p>
+            <a:r>
+              <a:rPr lang="en-US" dirty="0" smtClean="0"/>
+              <a:t>Discharge Status Code</a:t>
+            </a:r>
+          </a:p>
+          <a:p>
+            <a:r>
+              <a:rPr lang="en-US" dirty="0" smtClean="0"/>
+              <a:t>Admitting Diagnosis</a:t>
+            </a:r>
+          </a:p>
+          <a:p>
+            <a:r>
+              <a:rPr lang="en-US" dirty="0" smtClean="0"/>
+              <a:t>Present on Admission Code</a:t>
+            </a:r>
             <a:endParaRPr lang="en-US" dirty="0"/>
           </a:p>
         </p:txBody>
@@ -6817,6 +7334,10 @@
           <a:bodyPr/>
           <a:lstStyle/>
           <a:p>
+            <a:r>
+              <a:rPr lang="en-US" smtClean="0"/>
+              <a:t>References</a:t>
+            </a:r>
             <a:endParaRPr lang="en-US"/>
           </a:p>
         </p:txBody>
@@ -6836,145 +7357,64 @@
           <a:bodyPr/>
           <a:lstStyle/>
           <a:p>
-            <a:endParaRPr lang="en-US" dirty="0"/>
-          </a:p>
-        </p:txBody>
-      </p:sp>
-    </p:spTree>
-    <p:extLst>
-      <p:ext uri="{BB962C8B-B14F-4D97-AF65-F5344CB8AC3E}">
-        <p14:creationId xmlns:p14="http://schemas.microsoft.com/office/powerpoint/2010/main" val="652634943"/>
-      </p:ext>
-    </p:extLst>
-  </p:cSld>
-  <p:clrMapOvr>
-    <a:masterClrMapping/>
-  </p:clrMapOvr>
-</p:sld>
-</file>
-
-<file path=ppt/slides/slide5.xml><?xml version="1.0" encoding="utf-8"?>
-<p:sld xmlns:a="http://schemas.openxmlformats.org/drawingml/2006/main" xmlns:r="http://schemas.openxmlformats.org/officeDocument/2006/relationships" xmlns:p="http://schemas.openxmlformats.org/presentationml/2006/main">
-  <p:cSld>
-    <p:spTree>
-      <p:nvGrpSpPr>
-        <p:cNvPr id="1" name=""/>
-        <p:cNvGrpSpPr/>
-        <p:nvPr/>
-      </p:nvGrpSpPr>
-      <p:grpSpPr>
-        <a:xfrm>
-          <a:off x="0" y="0"/>
-          <a:ext cx="0" cy="0"/>
-          <a:chOff x="0" y="0"/>
-          <a:chExt cx="0" cy="0"/>
-        </a:xfrm>
-      </p:grpSpPr>
-      <p:sp>
-        <p:nvSpPr>
-          <p:cNvPr id="2" name="Title 1"/>
-          <p:cNvSpPr>
-            <a:spLocks noGrp="1"/>
-          </p:cNvSpPr>
-          <p:nvPr>
-            <p:ph type="title"/>
-          </p:nvPr>
-        </p:nvSpPr>
-        <p:spPr/>
-        <p:txBody>
-          <a:bodyPr/>
-          <a:lstStyle/>
-          <a:p>
-            <a:endParaRPr lang="en-US"/>
-          </a:p>
-        </p:txBody>
-      </p:sp>
-      <p:sp>
-        <p:nvSpPr>
-          <p:cNvPr id="3" name="Content Placeholder 2"/>
-          <p:cNvSpPr>
-            <a:spLocks noGrp="1"/>
-          </p:cNvSpPr>
-          <p:nvPr>
-            <p:ph idx="1"/>
-          </p:nvPr>
-        </p:nvSpPr>
-        <p:spPr/>
-        <p:txBody>
-          <a:bodyPr/>
-          <a:lstStyle/>
-          <a:p>
-            <a:endParaRPr lang="en-US" dirty="0"/>
-          </a:p>
-        </p:txBody>
-      </p:sp>
-    </p:spTree>
-    <p:extLst>
-      <p:ext uri="{BB962C8B-B14F-4D97-AF65-F5344CB8AC3E}">
-        <p14:creationId xmlns:p14="http://schemas.microsoft.com/office/powerpoint/2010/main" val="652634943"/>
-      </p:ext>
-    </p:extLst>
-  </p:cSld>
-  <p:clrMapOvr>
-    <a:masterClrMapping/>
-  </p:clrMapOvr>
-</p:sld>
-</file>
-
-<file path=ppt/slides/slide6.xml><?xml version="1.0" encoding="utf-8"?>
-<p:sld xmlns:a="http://schemas.openxmlformats.org/drawingml/2006/main" xmlns:r="http://schemas.openxmlformats.org/officeDocument/2006/relationships" xmlns:p="http://schemas.openxmlformats.org/presentationml/2006/main">
-  <p:cSld>
-    <p:spTree>
-      <p:nvGrpSpPr>
-        <p:cNvPr id="1" name=""/>
-        <p:cNvGrpSpPr/>
-        <p:nvPr/>
-      </p:nvGrpSpPr>
-      <p:grpSpPr>
-        <a:xfrm>
-          <a:off x="0" y="0"/>
-          <a:ext cx="0" cy="0"/>
-          <a:chOff x="0" y="0"/>
-          <a:chExt cx="0" cy="0"/>
-        </a:xfrm>
-      </p:grpSpPr>
-      <p:sp>
-        <p:nvSpPr>
-          <p:cNvPr id="2" name="Title 1"/>
-          <p:cNvSpPr>
-            <a:spLocks noGrp="1"/>
-          </p:cNvSpPr>
-          <p:nvPr>
-            <p:ph type="title"/>
-          </p:nvPr>
-        </p:nvSpPr>
-        <p:spPr/>
-        <p:txBody>
-          <a:bodyPr/>
-          <a:lstStyle/>
-          <a:p>
-            <a:r>
-              <a:rPr lang="en-US" smtClean="0"/>
-              <a:t>References</a:t>
-            </a:r>
-            <a:endParaRPr lang="en-US"/>
-          </a:p>
-        </p:txBody>
-      </p:sp>
-      <p:sp>
-        <p:nvSpPr>
-          <p:cNvPr id="3" name="Content Placeholder 2"/>
-          <p:cNvSpPr>
-            <a:spLocks noGrp="1"/>
-          </p:cNvSpPr>
-          <p:nvPr>
-            <p:ph idx="1"/>
-          </p:nvPr>
-        </p:nvSpPr>
-        <p:spPr/>
-        <p:txBody>
-          <a:bodyPr/>
-          <a:lstStyle/>
+            <a:r>
+              <a:rPr lang="en-US">
+                <a:hlinkClick r:id="rId2"/>
+              </a:rPr>
+              <a:t>https://www.medicare.gov/Pubs/pdf/11435.pdf</a:t>
+            </a:r>
+          </a:p>
+          <a:p>
+            <a:r>
+              <a:rPr lang="en-US" dirty="0" smtClean="0">
+                <a:hlinkClick r:id="rId2"/>
+              </a:rPr>
+              <a:t>http</a:t>
+            </a:r>
+            <a:r>
+              <a:rPr lang="en-US" dirty="0">
+                <a:hlinkClick r:id="rId2"/>
+              </a:rPr>
+              <a:t>://</a:t>
+            </a:r>
+            <a:r>
+              <a:rPr lang="en-US" dirty="0" smtClean="0">
+                <a:hlinkClick r:id="rId2"/>
+              </a:rPr>
+              <a:t>www.scha.org/files/documents/patient_discharge_status_hx_10-01-09_10-01-13.pdf</a:t>
+            </a:r>
+            <a:endParaRPr lang="en-US" dirty="0" smtClean="0"/>
+          </a:p>
+          <a:p>
+            <a:r>
+              <a:rPr lang="en-US" dirty="0">
+                <a:hlinkClick r:id="rId3"/>
+              </a:rPr>
+              <a:t>http://</a:t>
+            </a:r>
+            <a:r>
+              <a:rPr lang="en-US" dirty="0" smtClean="0">
+                <a:hlinkClick r:id="rId3"/>
+              </a:rPr>
+              <a:t>www.resdac.org/cms-data/variables/Claim-Source-Inpatient-Admission-Code</a:t>
+            </a:r>
+            <a:endParaRPr lang="en-US" dirty="0" smtClean="0"/>
+          </a:p>
+          <a:p>
+            <a:r>
+              <a:rPr lang="en-US" dirty="0">
+                <a:hlinkClick r:id="rId4"/>
+              </a:rPr>
+              <a:t>http://</a:t>
+            </a:r>
+            <a:r>
+              <a:rPr lang="en-US" dirty="0" smtClean="0">
+                <a:hlinkClick r:id="rId4"/>
+              </a:rPr>
+              <a:t>www.resdac.org/cms-data/variables/Claim-Inpatient-Admission-Type-Code</a:t>
+            </a:r>
+            <a:endParaRPr lang="en-US" dirty="0" smtClean="0"/>
+          </a:p>
           <a:p>
             <a:endParaRPr lang="en-US" dirty="0"/>
           </a:p>
@@ -7493,8 +7933,293 @@
   <a:extraClrSchemeLst/>
   <a:extLst>
     <a:ext uri="{05A4C25C-085E-4340-85A3-A5531E510DB2}">
-      <thm15:themeFamily xmlns="" xmlns:thm15="http://schemas.microsoft.com/office/thememl/2012/main" name="Gallery" id="{BBFCD31E-59A1-489D-B089-A3EAD7CAE12E}" vid="{AC464412-510E-4F2B-8947-A0DDBD028997}"/>
+      <thm15:themeFamily xmlns:thm15="http://schemas.microsoft.com/office/thememl/2012/main" xmlns="" name="Gallery" id="{BBFCD31E-59A1-489D-B089-A3EAD7CAE12E}" vid="{AC464412-510E-4F2B-8947-A0DDBD028997}"/>
     </a:ext>
   </a:extLst>
 </a:theme>
+</file>
+
+<file path=ppt/theme/theme3.xml><?xml version="1.0" encoding="utf-8"?>
+<a:theme xmlns:a="http://schemas.openxmlformats.org/drawingml/2006/main" name="Office Theme">
+  <a:themeElements>
+    <a:clrScheme name="Office">
+      <a:dk1>
+        <a:sysClr val="windowText" lastClr="000000"/>
+      </a:dk1>
+      <a:lt1>
+        <a:sysClr val="window" lastClr="FFFFFF"/>
+      </a:lt1>
+      <a:dk2>
+        <a:srgbClr val="1F497D"/>
+      </a:dk2>
+      <a:lt2>
+        <a:srgbClr val="EEECE1"/>
+      </a:lt2>
+      <a:accent1>
+        <a:srgbClr val="4F81BD"/>
+      </a:accent1>
+      <a:accent2>
+        <a:srgbClr val="C0504D"/>
+      </a:accent2>
+      <a:accent3>
+        <a:srgbClr val="9BBB59"/>
+      </a:accent3>
+      <a:accent4>
+        <a:srgbClr val="8064A2"/>
+      </a:accent4>
+      <a:accent5>
+        <a:srgbClr val="4BACC6"/>
+      </a:accent5>
+      <a:accent6>
+        <a:srgbClr val="F79646"/>
+      </a:accent6>
+      <a:hlink>
+        <a:srgbClr val="0000FF"/>
+      </a:hlink>
+      <a:folHlink>
+        <a:srgbClr val="800080"/>
+      </a:folHlink>
+    </a:clrScheme>
+    <a:fontScheme name="Office">
+      <a:majorFont>
+        <a:latin typeface="Calibri"/>
+        <a:ea typeface=""/>
+        <a:cs typeface=""/>
+        <a:font script="Jpan" typeface="ＭＳ Ｐゴシック"/>
+        <a:font script="Hang" typeface="맑은 고딕"/>
+        <a:font script="Hans" typeface="宋体"/>
+        <a:font script="Hant" typeface="新細明體"/>
+        <a:font script="Arab" typeface="Times New Roman"/>
+        <a:font script="Hebr" typeface="Times New Roman"/>
+        <a:font script="Thai" typeface="Angsana New"/>
+        <a:font script="Ethi" typeface="Nyala"/>
+        <a:font script="Beng" typeface="Vrinda"/>
+        <a:font script="Gujr" typeface="Shruti"/>
+        <a:font script="Khmr" typeface="MoolBoran"/>
+        <a:font script="Knda" typeface="Tunga"/>
+        <a:font script="Guru" typeface="Raavi"/>
+        <a:font script="Cans" typeface="Euphemia"/>
+        <a:font script="Cher" typeface="Plantagenet Cherokee"/>
+        <a:font script="Yiii" typeface="Microsoft Yi Baiti"/>
+        <a:font script="Tibt" typeface="Microsoft Himalaya"/>
+        <a:font script="Thaa" typeface="MV Boli"/>
+        <a:font script="Deva" typeface="Mangal"/>
+        <a:font script="Telu" typeface="Gautami"/>
+        <a:font script="Taml" typeface="Latha"/>
+        <a:font script="Syrc" typeface="Estrangelo Edessa"/>
+        <a:font script="Orya" typeface="Kalinga"/>
+        <a:font script="Mlym" typeface="Kartika"/>
+        <a:font script="Laoo" typeface="DokChampa"/>
+        <a:font script="Sinh" typeface="Iskoola Pota"/>
+        <a:font script="Mong" typeface="Mongolian Baiti"/>
+        <a:font script="Viet" typeface="Times New Roman"/>
+        <a:font script="Uigh" typeface="Microsoft Uighur"/>
+        <a:font script="Geor" typeface="Sylfaen"/>
+      </a:majorFont>
+      <a:minorFont>
+        <a:latin typeface="Calibri"/>
+        <a:ea typeface=""/>
+        <a:cs typeface=""/>
+        <a:font script="Jpan" typeface="ＭＳ Ｐゴシック"/>
+        <a:font script="Hang" typeface="맑은 고딕"/>
+        <a:font script="Hans" typeface="宋体"/>
+        <a:font script="Hant" typeface="新細明體"/>
+        <a:font script="Arab" typeface="Arial"/>
+        <a:font script="Hebr" typeface="Arial"/>
+        <a:font script="Thai" typeface="Cordia New"/>
+        <a:font script="Ethi" typeface="Nyala"/>
+        <a:font script="Beng" typeface="Vrinda"/>
+        <a:font script="Gujr" typeface="Shruti"/>
+        <a:font script="Khmr" typeface="DaunPenh"/>
+        <a:font script="Knda" typeface="Tunga"/>
+        <a:font script="Guru" typeface="Raavi"/>
+        <a:font script="Cans" typeface="Euphemia"/>
+        <a:font script="Cher" typeface="Plantagenet Cherokee"/>
+        <a:font script="Yiii" typeface="Microsoft Yi Baiti"/>
+        <a:font script="Tibt" typeface="Microsoft Himalaya"/>
+        <a:font script="Thaa" typeface="MV Boli"/>
+        <a:font script="Deva" typeface="Mangal"/>
+        <a:font script="Telu" typeface="Gautami"/>
+        <a:font script="Taml" typeface="Latha"/>
+        <a:font script="Syrc" typeface="Estrangelo Edessa"/>
+        <a:font script="Orya" typeface="Kalinga"/>
+        <a:font script="Mlym" typeface="Kartika"/>
+        <a:font script="Laoo" typeface="DokChampa"/>
+        <a:font script="Sinh" typeface="Iskoola Pota"/>
+        <a:font script="Mong" typeface="Mongolian Baiti"/>
+        <a:font script="Viet" typeface="Arial"/>
+        <a:font script="Uigh" typeface="Microsoft Uighur"/>
+        <a:font script="Geor" typeface="Sylfaen"/>
+      </a:minorFont>
+    </a:fontScheme>
+    <a:fmtScheme name="Office">
+      <a:fillStyleLst>
+        <a:solidFill>
+          <a:schemeClr val="phClr"/>
+        </a:solidFill>
+        <a:gradFill rotWithShape="1">
+          <a:gsLst>
+            <a:gs pos="0">
+              <a:schemeClr val="phClr">
+                <a:tint val="50000"/>
+                <a:satMod val="300000"/>
+              </a:schemeClr>
+            </a:gs>
+            <a:gs pos="35000">
+              <a:schemeClr val="phClr">
+                <a:tint val="37000"/>
+                <a:satMod val="300000"/>
+              </a:schemeClr>
+            </a:gs>
+            <a:gs pos="100000">
+              <a:schemeClr val="phClr">
+                <a:tint val="15000"/>
+                <a:satMod val="350000"/>
+              </a:schemeClr>
+            </a:gs>
+          </a:gsLst>
+          <a:lin ang="16200000" scaled="1"/>
+        </a:gradFill>
+        <a:gradFill rotWithShape="1">
+          <a:gsLst>
+            <a:gs pos="0">
+              <a:schemeClr val="phClr">
+                <a:shade val="51000"/>
+                <a:satMod val="130000"/>
+              </a:schemeClr>
+            </a:gs>
+            <a:gs pos="80000">
+              <a:schemeClr val="phClr">
+                <a:shade val="93000"/>
+                <a:satMod val="130000"/>
+              </a:schemeClr>
+            </a:gs>
+            <a:gs pos="100000">
+              <a:schemeClr val="phClr">
+                <a:shade val="94000"/>
+                <a:satMod val="135000"/>
+              </a:schemeClr>
+            </a:gs>
+          </a:gsLst>
+          <a:lin ang="16200000" scaled="0"/>
+        </a:gradFill>
+      </a:fillStyleLst>
+      <a:lnStyleLst>
+        <a:ln w="9525" cap="flat" cmpd="sng" algn="ctr">
+          <a:solidFill>
+            <a:schemeClr val="phClr">
+              <a:shade val="95000"/>
+              <a:satMod val="105000"/>
+            </a:schemeClr>
+          </a:solidFill>
+          <a:prstDash val="solid"/>
+        </a:ln>
+        <a:ln w="25400" cap="flat" cmpd="sng" algn="ctr">
+          <a:solidFill>
+            <a:schemeClr val="phClr"/>
+          </a:solidFill>
+          <a:prstDash val="solid"/>
+        </a:ln>
+        <a:ln w="38100" cap="flat" cmpd="sng" algn="ctr">
+          <a:solidFill>
+            <a:schemeClr val="phClr"/>
+          </a:solidFill>
+          <a:prstDash val="solid"/>
+        </a:ln>
+      </a:lnStyleLst>
+      <a:effectStyleLst>
+        <a:effectStyle>
+          <a:effectLst>
+            <a:outerShdw blurRad="40000" dist="20000" dir="5400000" rotWithShape="0">
+              <a:srgbClr val="000000">
+                <a:alpha val="38000"/>
+              </a:srgbClr>
+            </a:outerShdw>
+          </a:effectLst>
+        </a:effectStyle>
+        <a:effectStyle>
+          <a:effectLst>
+            <a:outerShdw blurRad="40000" dist="23000" dir="5400000" rotWithShape="0">
+              <a:srgbClr val="000000">
+                <a:alpha val="35000"/>
+              </a:srgbClr>
+            </a:outerShdw>
+          </a:effectLst>
+        </a:effectStyle>
+        <a:effectStyle>
+          <a:effectLst>
+            <a:outerShdw blurRad="40000" dist="23000" dir="5400000" rotWithShape="0">
+              <a:srgbClr val="000000">
+                <a:alpha val="35000"/>
+              </a:srgbClr>
+            </a:outerShdw>
+          </a:effectLst>
+          <a:scene3d>
+            <a:camera prst="orthographicFront">
+              <a:rot lat="0" lon="0" rev="0"/>
+            </a:camera>
+            <a:lightRig rig="threePt" dir="t">
+              <a:rot lat="0" lon="0" rev="1200000"/>
+            </a:lightRig>
+          </a:scene3d>
+          <a:sp3d>
+            <a:bevelT w="63500" h="25400"/>
+          </a:sp3d>
+        </a:effectStyle>
+      </a:effectStyleLst>
+      <a:bgFillStyleLst>
+        <a:solidFill>
+          <a:schemeClr val="phClr"/>
+        </a:solidFill>
+        <a:gradFill rotWithShape="1">
+          <a:gsLst>
+            <a:gs pos="0">
+              <a:schemeClr val="phClr">
+                <a:tint val="40000"/>
+                <a:satMod val="350000"/>
+              </a:schemeClr>
+            </a:gs>
+            <a:gs pos="40000">
+              <a:schemeClr val="phClr">
+                <a:tint val="45000"/>
+                <a:shade val="99000"/>
+                <a:satMod val="350000"/>
+              </a:schemeClr>
+            </a:gs>
+            <a:gs pos="100000">
+              <a:schemeClr val="phClr">
+                <a:shade val="20000"/>
+                <a:satMod val="255000"/>
+              </a:schemeClr>
+            </a:gs>
+          </a:gsLst>
+          <a:path path="circle">
+            <a:fillToRect l="50000" t="-80000" r="50000" b="180000"/>
+          </a:path>
+        </a:gradFill>
+        <a:gradFill rotWithShape="1">
+          <a:gsLst>
+            <a:gs pos="0">
+              <a:schemeClr val="phClr">
+                <a:tint val="80000"/>
+                <a:satMod val="300000"/>
+              </a:schemeClr>
+            </a:gs>
+            <a:gs pos="100000">
+              <a:schemeClr val="phClr">
+                <a:shade val="30000"/>
+                <a:satMod val="200000"/>
+              </a:schemeClr>
+            </a:gs>
+          </a:gsLst>
+          <a:path path="circle">
+            <a:fillToRect l="50000" t="50000" r="50000" b="50000"/>
+          </a:path>
+        </a:gradFill>
+      </a:bgFillStyleLst>
+    </a:fmtScheme>
+  </a:themeElements>
+  <a:objectDefaults/>
+  <a:extraClrSchemeLst/>
+</a:theme>
 </file>
</xml_diff>